<commit_message>
FIx checkstyle and add UI images for Statistics
</commit_message>
<xml_diff>
--- a/docs/diagrams/ClearOrderSequenceDiagram.pptx
+++ b/docs/diagrams/ClearOrderSequenceDiagram.pptx
@@ -7635,8 +7635,8 @@
         </p:nvSpPr>
         <p:spPr>
           <a:xfrm>
-            <a:off x="5725317" y="3581400"/>
-            <a:ext cx="2123283" cy="169277"/>
+            <a:off x="5725317" y="3575770"/>
+            <a:ext cx="2616996" cy="174908"/>
           </a:xfrm>
           <a:prstGeom prst="rect">
             <a:avLst/>
@@ -8232,8 +8232,8 @@
           </p:nvSpPr>
           <p:spPr>
             <a:xfrm>
-              <a:off x="7086600" y="2918532"/>
-              <a:ext cx="1335011" cy="184666"/>
+              <a:off x="7086600" y="2835476"/>
+              <a:ext cx="2066213" cy="196172"/>
             </a:xfrm>
             <a:prstGeom prst="rect">
               <a:avLst/>

</xml_diff>